<commit_message>
suite redaction manuUtilisateur Debut redaction compterendu technique photo des tests autres devices
</commit_message>
<xml_diff>
--- a/ManuelUtilisateur.pptx
+++ b/ManuelUtilisateur.pptx
@@ -6,14 +6,15 @@
   </p:sldMasterIdLst>
   <p:sldIdLst>
     <p:sldId id="256" r:id="rId2"/>
-    <p:sldId id="257" r:id="rId3"/>
-    <p:sldId id="258" r:id="rId4"/>
-    <p:sldId id="259" r:id="rId5"/>
-    <p:sldId id="262" r:id="rId6"/>
-    <p:sldId id="260" r:id="rId7"/>
-    <p:sldId id="261" r:id="rId8"/>
-    <p:sldId id="263" r:id="rId9"/>
+    <p:sldId id="265" r:id="rId3"/>
+    <p:sldId id="257" r:id="rId4"/>
+    <p:sldId id="258" r:id="rId5"/>
+    <p:sldId id="259" r:id="rId6"/>
+    <p:sldId id="262" r:id="rId7"/>
+    <p:sldId id="260" r:id="rId8"/>
+    <p:sldId id="261" r:id="rId9"/>
     <p:sldId id="264" r:id="rId10"/>
+    <p:sldId id="266" r:id="rId11"/>
   </p:sldIdLst>
   <p:sldSz cx="12192000" cy="6858000"/>
   <p:notesSz cx="6858000" cy="9144000"/>
@@ -112,6 +113,11 @@
       </a:defRPr>
     </a:lvl9pPr>
   </p:defaultTextStyle>
+  <p:extLst>
+    <p:ext uri="{EFAFB233-063F-42B5-8137-9DF3F51BA10A}">
+      <p15:sldGuideLst xmlns:p15="http://schemas.microsoft.com/office/powerpoint/2012/main"/>
+    </p:ext>
+  </p:extLst>
 </p:presentation>
 </file>
 
@@ -246,7 +252,7 @@
           <a:p>
             <a:fld id="{0035BCDF-0564-4679-99CF-E79D2F4CA840}" type="datetimeFigureOut">
               <a:rPr lang="fr-FR" smtClean="0"/>
-              <a:t>23/02/2015</a:t>
+              <a:t>27/02/2015</a:t>
             </a:fld>
             <a:endParaRPr lang="fr-FR"/>
           </a:p>
@@ -416,7 +422,7 @@
           <a:p>
             <a:fld id="{0035BCDF-0564-4679-99CF-E79D2F4CA840}" type="datetimeFigureOut">
               <a:rPr lang="fr-FR" smtClean="0"/>
-              <a:t>23/02/2015</a:t>
+              <a:t>27/02/2015</a:t>
             </a:fld>
             <a:endParaRPr lang="fr-FR"/>
           </a:p>
@@ -596,7 +602,7 @@
           <a:p>
             <a:fld id="{0035BCDF-0564-4679-99CF-E79D2F4CA840}" type="datetimeFigureOut">
               <a:rPr lang="fr-FR" smtClean="0"/>
-              <a:t>23/02/2015</a:t>
+              <a:t>27/02/2015</a:t>
             </a:fld>
             <a:endParaRPr lang="fr-FR"/>
           </a:p>
@@ -766,7 +772,7 @@
           <a:p>
             <a:fld id="{0035BCDF-0564-4679-99CF-E79D2F4CA840}" type="datetimeFigureOut">
               <a:rPr lang="fr-FR" smtClean="0"/>
-              <a:t>23/02/2015</a:t>
+              <a:t>27/02/2015</a:t>
             </a:fld>
             <a:endParaRPr lang="fr-FR"/>
           </a:p>
@@ -1012,7 +1018,7 @@
           <a:p>
             <a:fld id="{0035BCDF-0564-4679-99CF-E79D2F4CA840}" type="datetimeFigureOut">
               <a:rPr lang="fr-FR" smtClean="0"/>
-              <a:t>23/02/2015</a:t>
+              <a:t>27/02/2015</a:t>
             </a:fld>
             <a:endParaRPr lang="fr-FR"/>
           </a:p>
@@ -1244,7 +1250,7 @@
           <a:p>
             <a:fld id="{0035BCDF-0564-4679-99CF-E79D2F4CA840}" type="datetimeFigureOut">
               <a:rPr lang="fr-FR" smtClean="0"/>
-              <a:t>23/02/2015</a:t>
+              <a:t>27/02/2015</a:t>
             </a:fld>
             <a:endParaRPr lang="fr-FR"/>
           </a:p>
@@ -1611,7 +1617,7 @@
           <a:p>
             <a:fld id="{0035BCDF-0564-4679-99CF-E79D2F4CA840}" type="datetimeFigureOut">
               <a:rPr lang="fr-FR" smtClean="0"/>
-              <a:t>23/02/2015</a:t>
+              <a:t>27/02/2015</a:t>
             </a:fld>
             <a:endParaRPr lang="fr-FR"/>
           </a:p>
@@ -1729,7 +1735,7 @@
           <a:p>
             <a:fld id="{0035BCDF-0564-4679-99CF-E79D2F4CA840}" type="datetimeFigureOut">
               <a:rPr lang="fr-FR" smtClean="0"/>
-              <a:t>23/02/2015</a:t>
+              <a:t>27/02/2015</a:t>
             </a:fld>
             <a:endParaRPr lang="fr-FR"/>
           </a:p>
@@ -1824,7 +1830,7 @@
           <a:p>
             <a:fld id="{0035BCDF-0564-4679-99CF-E79D2F4CA840}" type="datetimeFigureOut">
               <a:rPr lang="fr-FR" smtClean="0"/>
-              <a:t>23/02/2015</a:t>
+              <a:t>27/02/2015</a:t>
             </a:fld>
             <a:endParaRPr lang="fr-FR"/>
           </a:p>
@@ -2101,7 +2107,7 @@
           <a:p>
             <a:fld id="{0035BCDF-0564-4679-99CF-E79D2F4CA840}" type="datetimeFigureOut">
               <a:rPr lang="fr-FR" smtClean="0"/>
-              <a:t>23/02/2015</a:t>
+              <a:t>27/02/2015</a:t>
             </a:fld>
             <a:endParaRPr lang="fr-FR"/>
           </a:p>
@@ -2354,7 +2360,7 @@
           <a:p>
             <a:fld id="{0035BCDF-0564-4679-99CF-E79D2F4CA840}" type="datetimeFigureOut">
               <a:rPr lang="fr-FR" smtClean="0"/>
-              <a:t>23/02/2015</a:t>
+              <a:t>27/02/2015</a:t>
             </a:fld>
             <a:endParaRPr lang="fr-FR"/>
           </a:p>
@@ -2567,7 +2573,7 @@
           <a:p>
             <a:fld id="{0035BCDF-0564-4679-99CF-E79D2F4CA840}" type="datetimeFigureOut">
               <a:rPr lang="fr-FR" smtClean="0"/>
-              <a:t>23/02/2015</a:t>
+              <a:t>27/02/2015</a:t>
             </a:fld>
             <a:endParaRPr lang="fr-FR"/>
           </a:p>
@@ -3010,29 +3016,6 @@
           </a:p>
         </p:txBody>
       </p:sp>
-      <p:pic>
-        <p:nvPicPr>
-          <p:cNvPr id="4" name="Image 3"/>
-          <p:cNvPicPr>
-            <a:picLocks noChangeAspect="1"/>
-          </p:cNvPicPr>
-          <p:nvPr/>
-        </p:nvPicPr>
-        <p:blipFill rotWithShape="1">
-          <a:blip r:embed="rId2"/>
-          <a:srcRect t="7978" r="1505" b="3476"/>
-          <a:stretch/>
-        </p:blipFill>
-        <p:spPr>
-          <a:xfrm>
-            <a:off x="585285" y="1122363"/>
-            <a:ext cx="11021427" cy="5570621"/>
-          </a:xfrm>
-          <a:prstGeom prst="rect">
-            <a:avLst/>
-          </a:prstGeom>
-        </p:spPr>
-      </p:pic>
       <p:sp>
         <p:nvSpPr>
           <p:cNvPr id="5" name="ZoneTexte 4"/>
@@ -3041,7 +3024,7 @@
         </p:nvSpPr>
         <p:spPr>
           <a:xfrm>
-            <a:off x="4218049" y="389784"/>
+            <a:off x="7815491" y="155626"/>
             <a:ext cx="3755900" cy="584775"/>
           </a:xfrm>
           <a:prstGeom prst="rect">
@@ -3081,6 +3064,59 @@
           </a:p>
         </p:txBody>
       </p:sp>
+      <p:pic>
+        <p:nvPicPr>
+          <p:cNvPr id="6" name="Image 5"/>
+          <p:cNvPicPr>
+            <a:picLocks noChangeAspect="1"/>
+          </p:cNvPicPr>
+          <p:nvPr/>
+        </p:nvPicPr>
+        <p:blipFill rotWithShape="1">
+          <a:blip r:embed="rId2"/>
+          <a:srcRect t="8388" r="1514"/>
+          <a:stretch/>
+        </p:blipFill>
+        <p:spPr>
+          <a:xfrm>
+            <a:off x="493296" y="943214"/>
+            <a:ext cx="11309684" cy="5914786"/>
+          </a:xfrm>
+          <a:prstGeom prst="rect">
+            <a:avLst/>
+          </a:prstGeom>
+        </p:spPr>
+      </p:pic>
+      <p:sp>
+        <p:nvSpPr>
+          <p:cNvPr id="7" name="ZoneTexte 6"/>
+          <p:cNvSpPr txBox="1"/>
+          <p:nvPr/>
+        </p:nvSpPr>
+        <p:spPr>
+          <a:xfrm>
+            <a:off x="8707656" y="601773"/>
+            <a:ext cx="3484344" cy="369332"/>
+          </a:xfrm>
+          <a:prstGeom prst="rect">
+            <a:avLst/>
+          </a:prstGeom>
+          <a:noFill/>
+        </p:spPr>
+        <p:txBody>
+          <a:bodyPr wrap="square" rtlCol="0">
+            <a:spAutoFit/>
+          </a:bodyPr>
+          <a:lstStyle/>
+          <a:p>
+            <a:r>
+              <a:rPr lang="fr-FR" dirty="0" smtClean="0"/>
+              <a:t>Guide d’installation page 10</a:t>
+            </a:r>
+            <a:endParaRPr lang="fr-FR" dirty="0"/>
+          </a:p>
+        </p:txBody>
+      </p:sp>
     </p:spTree>
     <p:extLst>
       <p:ext uri="{BB962C8B-B14F-4D97-AF65-F5344CB8AC3E}">
@@ -3091,6 +3127,435 @@
   <p:clrMapOvr>
     <a:masterClrMapping/>
   </p:clrMapOvr>
+  <p:timing>
+    <p:tnLst>
+      <p:par>
+        <p:cTn id="1" dur="indefinite" restart="never" nodeType="tmRoot"/>
+      </p:par>
+    </p:tnLst>
+  </p:timing>
+</p:sld>
+</file>
+
+<file path=ppt/slides/slide10.xml><?xml version="1.0" encoding="utf-8"?>
+<p:sld xmlns:a="http://schemas.openxmlformats.org/drawingml/2006/main" xmlns:r="http://schemas.openxmlformats.org/officeDocument/2006/relationships" xmlns:p="http://schemas.openxmlformats.org/presentationml/2006/main">
+  <p:cSld>
+    <p:spTree>
+      <p:nvGrpSpPr>
+        <p:cNvPr id="1" name=""/>
+        <p:cNvGrpSpPr/>
+        <p:nvPr/>
+      </p:nvGrpSpPr>
+      <p:grpSpPr>
+        <a:xfrm>
+          <a:off x="0" y="0"/>
+          <a:ext cx="0" cy="0"/>
+          <a:chOff x="0" y="0"/>
+          <a:chExt cx="0" cy="0"/>
+        </a:xfrm>
+      </p:grpSpPr>
+      <p:sp>
+        <p:nvSpPr>
+          <p:cNvPr id="2" name="ZoneTexte 1"/>
+          <p:cNvSpPr txBox="1"/>
+          <p:nvPr/>
+        </p:nvSpPr>
+        <p:spPr>
+          <a:xfrm>
+            <a:off x="401856" y="259080"/>
+            <a:ext cx="3484344" cy="369332"/>
+          </a:xfrm>
+          <a:prstGeom prst="rect">
+            <a:avLst/>
+          </a:prstGeom>
+          <a:noFill/>
+        </p:spPr>
+        <p:txBody>
+          <a:bodyPr wrap="square" rtlCol="0">
+            <a:spAutoFit/>
+          </a:bodyPr>
+          <a:lstStyle/>
+          <a:p>
+            <a:r>
+              <a:rPr lang="fr-FR" b="1" u="sng" dirty="0" smtClean="0"/>
+              <a:t>Guide d’installation </a:t>
+            </a:r>
+            <a:r>
+              <a:rPr lang="fr-FR" dirty="0" smtClean="0"/>
+              <a:t>:</a:t>
+            </a:r>
+            <a:endParaRPr lang="fr-FR" dirty="0"/>
+          </a:p>
+        </p:txBody>
+      </p:sp>
+      <p:sp>
+        <p:nvSpPr>
+          <p:cNvPr id="3" name="ZoneTexte 2"/>
+          <p:cNvSpPr txBox="1"/>
+          <p:nvPr/>
+        </p:nvSpPr>
+        <p:spPr>
+          <a:xfrm>
+            <a:off x="401856" y="787438"/>
+            <a:ext cx="11287224" cy="5632311"/>
+          </a:xfrm>
+          <a:prstGeom prst="rect">
+            <a:avLst/>
+          </a:prstGeom>
+          <a:noFill/>
+        </p:spPr>
+        <p:txBody>
+          <a:bodyPr wrap="square" rtlCol="0">
+            <a:spAutoFit/>
+          </a:bodyPr>
+          <a:lstStyle/>
+          <a:p>
+            <a:r>
+              <a:rPr lang="fr-FR" dirty="0" smtClean="0"/>
+              <a:t>Copier le dossier complet </a:t>
+            </a:r>
+            <a:r>
+              <a:rPr lang="fr-FR" dirty="0"/>
+              <a:t>dans </a:t>
+            </a:r>
+            <a:r>
+              <a:rPr lang="fr-FR" b="1" dirty="0"/>
+              <a:t>C:\xampp\htdocs</a:t>
+            </a:r>
+            <a:endParaRPr lang="fr-FR" b="1" dirty="0" smtClean="0"/>
+          </a:p>
+          <a:p>
+            <a:endParaRPr lang="fr-FR" dirty="0" smtClean="0"/>
+          </a:p>
+          <a:p>
+            <a:endParaRPr lang="fr-FR" dirty="0"/>
+          </a:p>
+          <a:p>
+            <a:r>
+              <a:rPr lang="fr-FR" dirty="0" smtClean="0"/>
+              <a:t>Ouvrir </a:t>
+            </a:r>
+            <a:r>
+              <a:rPr lang="fr-FR" b="1" dirty="0" err="1"/>
+              <a:t>X</a:t>
+            </a:r>
+            <a:r>
+              <a:rPr lang="fr-FR" b="1" dirty="0" err="1" smtClean="0"/>
+              <a:t>ampp</a:t>
+            </a:r>
+            <a:r>
+              <a:rPr lang="fr-FR" b="1" dirty="0" smtClean="0"/>
+              <a:t> </a:t>
+            </a:r>
+            <a:r>
+              <a:rPr lang="fr-FR" dirty="0" smtClean="0"/>
+              <a:t>control panel</a:t>
+            </a:r>
+          </a:p>
+          <a:p>
+            <a:r>
+              <a:rPr lang="fr-FR" dirty="0" smtClean="0"/>
+              <a:t>Clic sur </a:t>
+            </a:r>
+            <a:r>
+              <a:rPr lang="fr-FR" b="1" dirty="0" smtClean="0"/>
+              <a:t>Apache</a:t>
+            </a:r>
+          </a:p>
+          <a:p>
+            <a:r>
+              <a:rPr lang="fr-FR" dirty="0" smtClean="0"/>
+              <a:t>Clic sur </a:t>
+            </a:r>
+            <a:r>
+              <a:rPr lang="fr-FR" b="1" dirty="0" err="1"/>
+              <a:t>M</a:t>
+            </a:r>
+            <a:r>
+              <a:rPr lang="fr-FR" b="1" dirty="0" err="1" smtClean="0"/>
+              <a:t>ysql</a:t>
+            </a:r>
+            <a:endParaRPr lang="fr-FR" b="1" dirty="0" smtClean="0"/>
+          </a:p>
+          <a:p>
+            <a:endParaRPr lang="fr-FR" dirty="0" smtClean="0"/>
+          </a:p>
+          <a:p>
+            <a:endParaRPr lang="fr-FR" dirty="0"/>
+          </a:p>
+          <a:p>
+            <a:endParaRPr lang="fr-FR" dirty="0" smtClean="0"/>
+          </a:p>
+          <a:p>
+            <a:endParaRPr lang="fr-FR" dirty="0"/>
+          </a:p>
+          <a:p>
+            <a:r>
+              <a:rPr lang="fr-FR" dirty="0" smtClean="0"/>
+              <a:t>Clic sur Admin </a:t>
+            </a:r>
+          </a:p>
+          <a:p>
+            <a:r>
+              <a:rPr lang="fr-FR" dirty="0" smtClean="0"/>
+              <a:t>Sur la page </a:t>
+            </a:r>
+            <a:r>
+              <a:rPr lang="fr-FR" b="1" dirty="0" err="1" smtClean="0"/>
+              <a:t>phpMyAdmin</a:t>
+            </a:r>
+            <a:endParaRPr lang="fr-FR" b="1" dirty="0" smtClean="0"/>
+          </a:p>
+          <a:p>
+            <a:r>
+              <a:rPr lang="fr-FR" b="1" dirty="0" smtClean="0"/>
+              <a:t>Créer</a:t>
+            </a:r>
+            <a:r>
+              <a:rPr lang="fr-FR" dirty="0" smtClean="0"/>
+              <a:t> une nouvelle base nommé « </a:t>
+            </a:r>
+            <a:r>
+              <a:rPr lang="fr-FR" dirty="0" err="1" smtClean="0"/>
+              <a:t>projetweb</a:t>
+            </a:r>
+            <a:r>
+              <a:rPr lang="fr-FR" dirty="0" smtClean="0"/>
+              <a:t> »</a:t>
+            </a:r>
+          </a:p>
+          <a:p>
+            <a:endParaRPr lang="fr-FR" dirty="0" smtClean="0"/>
+          </a:p>
+          <a:p>
+            <a:r>
+              <a:rPr lang="fr-FR" dirty="0" smtClean="0"/>
+              <a:t>Cliquer sur </a:t>
+            </a:r>
+            <a:r>
+              <a:rPr lang="fr-FR" b="1" dirty="0" smtClean="0"/>
+              <a:t>Importer</a:t>
+            </a:r>
+            <a:r>
+              <a:rPr lang="fr-FR" dirty="0" smtClean="0"/>
+              <a:t> le fichier </a:t>
+            </a:r>
+          </a:p>
+          <a:p>
+            <a:r>
+              <a:rPr lang="fr-FR" dirty="0" smtClean="0"/>
+              <a:t>Sélectionner le fichier </a:t>
+            </a:r>
+            <a:r>
+              <a:rPr lang="fr-FR" dirty="0" err="1" smtClean="0"/>
+              <a:t>bdd.sql</a:t>
+            </a:r>
+            <a:r>
+              <a:rPr lang="fr-FR" dirty="0" smtClean="0"/>
+              <a:t> </a:t>
+            </a:r>
+          </a:p>
+          <a:p>
+            <a:endParaRPr lang="fr-FR" dirty="0" smtClean="0"/>
+          </a:p>
+          <a:p>
+            <a:endParaRPr lang="fr-FR" dirty="0" smtClean="0"/>
+          </a:p>
+          <a:p>
+            <a:r>
+              <a:rPr lang="fr-FR" dirty="0" smtClean="0"/>
+              <a:t>Aller dans un navigateur et saisir l’adresse suivante</a:t>
+            </a:r>
+          </a:p>
+          <a:p>
+            <a:r>
+              <a:rPr lang="fr-FR" dirty="0"/>
+              <a:t>http://</a:t>
+            </a:r>
+            <a:r>
+              <a:rPr lang="fr-FR" dirty="0" smtClean="0"/>
+              <a:t>127.0.0.1/</a:t>
+            </a:r>
+            <a:r>
+              <a:rPr lang="fr-FR" dirty="0" smtClean="0">
+                <a:solidFill>
+                  <a:srgbClr val="FF0000"/>
+                </a:solidFill>
+              </a:rPr>
+              <a:t>nomDuDossier</a:t>
+            </a:r>
+            <a:r>
+              <a:rPr lang="fr-FR" dirty="0" smtClean="0"/>
+              <a:t>/index.php</a:t>
+            </a:r>
+          </a:p>
+        </p:txBody>
+      </p:sp>
+      <p:pic>
+        <p:nvPicPr>
+          <p:cNvPr id="4" name="Image 3"/>
+          <p:cNvPicPr>
+            <a:picLocks noChangeAspect="1"/>
+          </p:cNvPicPr>
+          <p:nvPr/>
+        </p:nvPicPr>
+        <p:blipFill rotWithShape="1">
+          <a:blip r:embed="rId2"/>
+          <a:srcRect r="46178" b="75000"/>
+          <a:stretch/>
+        </p:blipFill>
+        <p:spPr>
+          <a:xfrm>
+            <a:off x="3572879" y="1371600"/>
+            <a:ext cx="7002880" cy="1828800"/>
+          </a:xfrm>
+          <a:prstGeom prst="rect">
+            <a:avLst/>
+          </a:prstGeom>
+        </p:spPr>
+      </p:pic>
+      <p:pic>
+        <p:nvPicPr>
+          <p:cNvPr id="5" name="Image 4"/>
+          <p:cNvPicPr>
+            <a:picLocks noChangeAspect="1"/>
+          </p:cNvPicPr>
+          <p:nvPr/>
+        </p:nvPicPr>
+        <p:blipFill rotWithShape="1">
+          <a:blip r:embed="rId3"/>
+          <a:srcRect t="7402" b="33717"/>
+          <a:stretch/>
+        </p:blipFill>
+        <p:spPr>
+          <a:xfrm>
+            <a:off x="4908884" y="3506757"/>
+            <a:ext cx="7037168" cy="2329636"/>
+          </a:xfrm>
+          <a:prstGeom prst="rect">
+            <a:avLst/>
+          </a:prstGeom>
+        </p:spPr>
+      </p:pic>
+      <p:cxnSp>
+        <p:nvCxnSpPr>
+          <p:cNvPr id="7" name="Connecteur droit avec flèche 6"/>
+          <p:cNvCxnSpPr/>
+          <p:nvPr/>
+        </p:nvCxnSpPr>
+        <p:spPr>
+          <a:xfrm flipV="1">
+            <a:off x="1876926" y="2755232"/>
+            <a:ext cx="5666874" cy="938463"/>
+          </a:xfrm>
+          <a:prstGeom prst="straightConnector1">
+            <a:avLst/>
+          </a:prstGeom>
+          <a:ln>
+            <a:solidFill>
+              <a:schemeClr val="accent2"/>
+            </a:solidFill>
+            <a:tailEnd type="triangle"/>
+          </a:ln>
+        </p:spPr>
+        <p:style>
+          <a:lnRef idx="1">
+            <a:schemeClr val="accent1"/>
+          </a:lnRef>
+          <a:fillRef idx="0">
+            <a:schemeClr val="accent1"/>
+          </a:fillRef>
+          <a:effectRef idx="0">
+            <a:schemeClr val="accent1"/>
+          </a:effectRef>
+          <a:fontRef idx="minor">
+            <a:schemeClr val="tx1"/>
+          </a:fontRef>
+        </p:style>
+      </p:cxnSp>
+      <p:cxnSp>
+        <p:nvCxnSpPr>
+          <p:cNvPr id="9" name="Connecteur droit avec flèche 8"/>
+          <p:cNvCxnSpPr/>
+          <p:nvPr/>
+        </p:nvCxnSpPr>
+        <p:spPr>
+          <a:xfrm flipV="1">
+            <a:off x="3296653" y="4000052"/>
+            <a:ext cx="1925052" cy="211541"/>
+          </a:xfrm>
+          <a:prstGeom prst="straightConnector1">
+            <a:avLst/>
+          </a:prstGeom>
+          <a:ln>
+            <a:tailEnd type="triangle"/>
+          </a:ln>
+        </p:spPr>
+        <p:style>
+          <a:lnRef idx="1">
+            <a:schemeClr val="accent2"/>
+          </a:lnRef>
+          <a:fillRef idx="0">
+            <a:schemeClr val="accent2"/>
+          </a:fillRef>
+          <a:effectRef idx="0">
+            <a:schemeClr val="accent2"/>
+          </a:effectRef>
+          <a:fontRef idx="minor">
+            <a:schemeClr val="tx1"/>
+          </a:fontRef>
+        </p:style>
+      </p:cxnSp>
+      <p:cxnSp>
+        <p:nvCxnSpPr>
+          <p:cNvPr id="12" name="Connecteur droit avec flèche 11"/>
+          <p:cNvCxnSpPr/>
+          <p:nvPr/>
+        </p:nvCxnSpPr>
+        <p:spPr>
+          <a:xfrm flipV="1">
+            <a:off x="3344779" y="3801979"/>
+            <a:ext cx="6701589" cy="998621"/>
+          </a:xfrm>
+          <a:prstGeom prst="straightConnector1">
+            <a:avLst/>
+          </a:prstGeom>
+          <a:ln>
+            <a:tailEnd type="triangle"/>
+          </a:ln>
+        </p:spPr>
+        <p:style>
+          <a:lnRef idx="1">
+            <a:schemeClr val="accent2"/>
+          </a:lnRef>
+          <a:fillRef idx="0">
+            <a:schemeClr val="accent2"/>
+          </a:fillRef>
+          <a:effectRef idx="0">
+            <a:schemeClr val="accent2"/>
+          </a:effectRef>
+          <a:fontRef idx="minor">
+            <a:schemeClr val="tx1"/>
+          </a:fontRef>
+        </p:style>
+      </p:cxnSp>
+    </p:spTree>
+    <p:extLst>
+      <p:ext uri="{BB962C8B-B14F-4D97-AF65-F5344CB8AC3E}">
+        <p14:creationId xmlns:p14="http://schemas.microsoft.com/office/powerpoint/2010/main" val="293919388"/>
+      </p:ext>
+    </p:extLst>
+  </p:cSld>
+  <p:clrMapOvr>
+    <a:masterClrMapping/>
+  </p:clrMapOvr>
+  <p:timing>
+    <p:tnLst>
+      <p:par>
+        <p:cTn id="1" dur="indefinite" restart="never" nodeType="tmRoot"/>
+      </p:par>
+    </p:tnLst>
+  </p:timing>
 </p:sld>
 </file>
 
@@ -3111,54 +3576,46 @@
           <a:chExt cx="0" cy="0"/>
         </a:xfrm>
       </p:grpSpPr>
-      <p:sp>
-        <p:nvSpPr>
-          <p:cNvPr id="4" name="ZoneTexte 3"/>
-          <p:cNvSpPr txBox="1"/>
+      <p:pic>
+        <p:nvPicPr>
+          <p:cNvPr id="4" name="Image 3"/>
+          <p:cNvPicPr>
+            <a:picLocks noChangeAspect="1"/>
+          </p:cNvPicPr>
           <p:nvPr/>
-        </p:nvSpPr>
+        </p:nvPicPr>
+        <p:blipFill rotWithShape="1">
+          <a:blip r:embed="rId2"/>
+          <a:srcRect t="8224" r="1237"/>
+          <a:stretch/>
+        </p:blipFill>
         <p:spPr>
           <a:xfrm>
-            <a:off x="792480" y="365760"/>
-            <a:ext cx="9692640" cy="369332"/>
+            <a:off x="252663" y="505327"/>
+            <a:ext cx="11422423" cy="5967662"/>
           </a:xfrm>
           <a:prstGeom prst="rect">
             <a:avLst/>
           </a:prstGeom>
-          <a:noFill/>
-        </p:spPr>
-        <p:txBody>
-          <a:bodyPr wrap="square" rtlCol="0">
-            <a:spAutoFit/>
-          </a:bodyPr>
-          <a:lstStyle/>
-          <a:p>
-            <a:r>
-              <a:rPr lang="fr-FR" dirty="0" smtClean="0"/>
-              <a:t>Sur la </a:t>
-            </a:r>
-            <a:r>
-              <a:rPr lang="fr-FR" dirty="0" err="1" smtClean="0"/>
-              <a:t>premiere</a:t>
-            </a:r>
-            <a:r>
-              <a:rPr lang="fr-FR" dirty="0" smtClean="0"/>
-              <a:t> page du site on peut voir apparaitre les coups de cœur du moment</a:t>
-            </a:r>
-            <a:endParaRPr lang="fr-FR" dirty="0"/>
-          </a:p>
-        </p:txBody>
-      </p:sp>
+        </p:spPr>
+      </p:pic>
     </p:spTree>
     <p:extLst>
       <p:ext uri="{BB962C8B-B14F-4D97-AF65-F5344CB8AC3E}">
-        <p14:creationId xmlns:p14="http://schemas.microsoft.com/office/powerpoint/2010/main" val="4091172141"/>
+        <p14:creationId xmlns:p14="http://schemas.microsoft.com/office/powerpoint/2010/main" val="1160467417"/>
       </p:ext>
     </p:extLst>
   </p:cSld>
   <p:clrMapOvr>
     <a:masterClrMapping/>
   </p:clrMapOvr>
+  <p:timing>
+    <p:tnLst>
+      <p:par>
+        <p:cTn id="1" dur="indefinite" restart="never" nodeType="tmRoot"/>
+      </p:par>
+    </p:tnLst>
+  </p:timing>
 </p:sld>
 </file>
 
@@ -3187,8 +3644,8 @@
         </p:nvSpPr>
         <p:spPr>
           <a:xfrm>
-            <a:off x="1127760" y="365760"/>
-            <a:ext cx="10104120" cy="369332"/>
+            <a:off x="792480" y="365760"/>
+            <a:ext cx="9692640" cy="369332"/>
           </a:xfrm>
           <a:prstGeom prst="rect">
             <a:avLst/>
@@ -3203,38 +3660,60 @@
           <a:p>
             <a:r>
               <a:rPr lang="fr-FR" dirty="0" smtClean="0"/>
-              <a:t>Offert : une fonction </a:t>
-            </a:r>
-            <a:r>
-              <a:rPr lang="fr-FR" dirty="0" err="1" smtClean="0"/>
-              <a:t>supplementaire</a:t>
+              <a:t>Sur la </a:t>
             </a:r>
             <a:r>
               <a:rPr lang="fr-FR" dirty="0" smtClean="0"/>
-              <a:t> au </a:t>
-            </a:r>
-            <a:r>
-              <a:rPr lang="fr-FR" dirty="0" err="1" smtClean="0"/>
-              <a:t>spec</a:t>
+              <a:t>première </a:t>
             </a:r>
             <a:r>
               <a:rPr lang="fr-FR" dirty="0" smtClean="0"/>
-              <a:t>   L’affichage des avis des clients</a:t>
+              <a:t>page du site on peut voir apparaitre les coups de cœur du moment</a:t>
             </a:r>
             <a:endParaRPr lang="fr-FR" dirty="0"/>
           </a:p>
         </p:txBody>
       </p:sp>
+      <p:pic>
+        <p:nvPicPr>
+          <p:cNvPr id="2" name="Image 1"/>
+          <p:cNvPicPr>
+            <a:picLocks noChangeAspect="1"/>
+          </p:cNvPicPr>
+          <p:nvPr/>
+        </p:nvPicPr>
+        <p:blipFill rotWithShape="1">
+          <a:blip r:embed="rId2"/>
+          <a:srcRect l="3333" t="14474" r="5213" b="11677"/>
+          <a:stretch/>
+        </p:blipFill>
+        <p:spPr>
+          <a:xfrm>
+            <a:off x="0" y="1070810"/>
+            <a:ext cx="11899232" cy="5402180"/>
+          </a:xfrm>
+          <a:prstGeom prst="rect">
+            <a:avLst/>
+          </a:prstGeom>
+        </p:spPr>
+      </p:pic>
     </p:spTree>
     <p:extLst>
       <p:ext uri="{BB962C8B-B14F-4D97-AF65-F5344CB8AC3E}">
-        <p14:creationId xmlns:p14="http://schemas.microsoft.com/office/powerpoint/2010/main" val="1466925758"/>
+        <p14:creationId xmlns:p14="http://schemas.microsoft.com/office/powerpoint/2010/main" val="4091172141"/>
       </p:ext>
     </p:extLst>
   </p:cSld>
   <p:clrMapOvr>
     <a:masterClrMapping/>
   </p:clrMapOvr>
+  <p:timing>
+    <p:tnLst>
+      <p:par>
+        <p:cTn id="1" dur="indefinite" restart="never" nodeType="tmRoot"/>
+      </p:par>
+    </p:tnLst>
+  </p:timing>
 </p:sld>
 </file>
 
@@ -3257,14 +3736,14 @@
       </p:grpSpPr>
       <p:sp>
         <p:nvSpPr>
-          <p:cNvPr id="2" name="ZoneTexte 1"/>
+          <p:cNvPr id="4" name="ZoneTexte 3"/>
           <p:cNvSpPr txBox="1"/>
           <p:nvPr/>
         </p:nvSpPr>
         <p:spPr>
           <a:xfrm>
-            <a:off x="304800" y="182880"/>
-            <a:ext cx="11551920" cy="646331"/>
+            <a:off x="1127760" y="365760"/>
+            <a:ext cx="10104120" cy="369332"/>
           </a:xfrm>
           <a:prstGeom prst="rect">
             <a:avLst/>
@@ -3279,47 +3758,23 @@
           <a:p>
             <a:r>
               <a:rPr lang="fr-FR" dirty="0" smtClean="0"/>
-              <a:t>La page des menu classiques avec une </a:t>
+              <a:t>Offert : une fonction </a:t>
+            </a:r>
+            <a:r>
+              <a:rPr lang="fr-FR" dirty="0" smtClean="0"/>
+              <a:t>supplémentaire </a:t>
+            </a:r>
+            <a:r>
+              <a:rPr lang="fr-FR" dirty="0" smtClean="0"/>
+              <a:t>au </a:t>
             </a:r>
             <a:r>
               <a:rPr lang="fr-FR" dirty="0" err="1" smtClean="0"/>
-              <a:t>selection</a:t>
+              <a:t>spec</a:t>
             </a:r>
             <a:r>
               <a:rPr lang="fr-FR" dirty="0" smtClean="0"/>
-              <a:t> par </a:t>
-            </a:r>
-            <a:r>
-              <a:rPr lang="fr-FR" dirty="0" err="1" smtClean="0"/>
-              <a:t>tye</a:t>
-            </a:r>
-            <a:r>
-              <a:rPr lang="fr-FR" dirty="0" smtClean="0"/>
-              <a:t> et/ou une </a:t>
-            </a:r>
-            <a:r>
-              <a:rPr lang="fr-FR" dirty="0" err="1" smtClean="0"/>
-              <a:t>selection</a:t>
-            </a:r>
-            <a:r>
-              <a:rPr lang="fr-FR" dirty="0" smtClean="0"/>
-              <a:t> par </a:t>
-            </a:r>
-            <a:r>
-              <a:rPr lang="fr-FR" dirty="0" err="1" smtClean="0"/>
-              <a:t>prix.Le</a:t>
-            </a:r>
-            <a:r>
-              <a:rPr lang="fr-FR" dirty="0" smtClean="0"/>
-              <a:t> </a:t>
-            </a:r>
-            <a:r>
-              <a:rPr lang="fr-FR" dirty="0" err="1" smtClean="0"/>
-              <a:t>boutton</a:t>
-            </a:r>
-            <a:r>
-              <a:rPr lang="fr-FR" dirty="0" smtClean="0"/>
-              <a:t> ajouter affiche directement au panier.</a:t>
+              <a:t>   L’affichage des avis des clients</a:t>
             </a:r>
             <a:endParaRPr lang="fr-FR" dirty="0"/>
           </a:p>
@@ -3327,7 +3782,7 @@
       </p:sp>
       <p:pic>
         <p:nvPicPr>
-          <p:cNvPr id="3" name="Image 2"/>
+          <p:cNvPr id="2" name="Image 1"/>
           <p:cNvPicPr>
             <a:picLocks noChangeAspect="1"/>
           </p:cNvPicPr>
@@ -3335,13 +3790,13 @@
         </p:nvPicPr>
         <p:blipFill rotWithShape="1">
           <a:blip r:embed="rId2"/>
-          <a:srcRect l="3856" t="8299" r="2435"/>
+          <a:srcRect l="-364" t="7650" r="3429" b="431"/>
           <a:stretch/>
         </p:blipFill>
         <p:spPr>
           <a:xfrm>
-            <a:off x="1311442" y="1311441"/>
-            <a:ext cx="9685422" cy="5328723"/>
+            <a:off x="685800" y="890753"/>
+            <a:ext cx="11192961" cy="5967247"/>
           </a:xfrm>
           <a:prstGeom prst="rect">
             <a:avLst/>
@@ -3351,13 +3806,20 @@
     </p:spTree>
     <p:extLst>
       <p:ext uri="{BB962C8B-B14F-4D97-AF65-F5344CB8AC3E}">
-        <p14:creationId xmlns:p14="http://schemas.microsoft.com/office/powerpoint/2010/main" val="3879888996"/>
+        <p14:creationId xmlns:p14="http://schemas.microsoft.com/office/powerpoint/2010/main" val="1466925758"/>
       </p:ext>
     </p:extLst>
   </p:cSld>
   <p:clrMapOvr>
     <a:masterClrMapping/>
   </p:clrMapOvr>
+  <p:timing>
+    <p:tnLst>
+      <p:par>
+        <p:cTn id="1" dur="indefinite" restart="never" nodeType="tmRoot"/>
+      </p:par>
+    </p:tnLst>
+  </p:timing>
 </p:sld>
 </file>
 
@@ -3386,8 +3848,8 @@
         </p:nvSpPr>
         <p:spPr>
           <a:xfrm>
-            <a:off x="1051560" y="121920"/>
-            <a:ext cx="10012680" cy="369332"/>
+            <a:off x="304800" y="182880"/>
+            <a:ext cx="11551920" cy="369332"/>
           </a:xfrm>
           <a:prstGeom prst="rect">
             <a:avLst/>
@@ -3402,30 +3864,64 @@
           <a:p>
             <a:r>
               <a:rPr lang="fr-FR" dirty="0" smtClean="0"/>
-              <a:t>La </a:t>
-            </a:r>
-            <a:r>
-              <a:rPr lang="fr-FR" dirty="0" err="1" smtClean="0"/>
-              <a:t>selection</a:t>
+              <a:t>La page des menu classiques avec une </a:t>
             </a:r>
             <a:r>
               <a:rPr lang="fr-FR" dirty="0" smtClean="0"/>
-              <a:t> du titre d’un produit affiche plusieurs photos</a:t>
+              <a:t>sélection </a:t>
+            </a:r>
+            <a:r>
+              <a:rPr lang="fr-FR" dirty="0" smtClean="0"/>
+              <a:t>par </a:t>
+            </a:r>
+            <a:r>
+              <a:rPr lang="fr-FR" dirty="0" smtClean="0"/>
+              <a:t>type d’article ou pour tous les articles</a:t>
             </a:r>
             <a:endParaRPr lang="fr-FR" dirty="0"/>
           </a:p>
         </p:txBody>
       </p:sp>
+      <p:pic>
+        <p:nvPicPr>
+          <p:cNvPr id="4" name="Image 3"/>
+          <p:cNvPicPr>
+            <a:picLocks noChangeAspect="1"/>
+          </p:cNvPicPr>
+          <p:nvPr/>
+        </p:nvPicPr>
+        <p:blipFill rotWithShape="1">
+          <a:blip r:embed="rId2"/>
+          <a:srcRect l="4480" t="7748" r="20879" b="19839"/>
+          <a:stretch/>
+        </p:blipFill>
+        <p:spPr>
+          <a:xfrm>
+            <a:off x="1024759" y="1008992"/>
+            <a:ext cx="9711559" cy="5297215"/>
+          </a:xfrm>
+          <a:prstGeom prst="rect">
+            <a:avLst/>
+          </a:prstGeom>
+        </p:spPr>
+      </p:pic>
     </p:spTree>
     <p:extLst>
       <p:ext uri="{BB962C8B-B14F-4D97-AF65-F5344CB8AC3E}">
-        <p14:creationId xmlns:p14="http://schemas.microsoft.com/office/powerpoint/2010/main" val="1141840705"/>
+        <p14:creationId xmlns:p14="http://schemas.microsoft.com/office/powerpoint/2010/main" val="3879888996"/>
       </p:ext>
     </p:extLst>
   </p:cSld>
   <p:clrMapOvr>
     <a:masterClrMapping/>
   </p:clrMapOvr>
+  <p:timing>
+    <p:tnLst>
+      <p:par>
+        <p:cTn id="1" dur="indefinite" restart="never" nodeType="tmRoot"/>
+      </p:par>
+    </p:tnLst>
+  </p:timing>
 </p:sld>
 </file>
 
@@ -3454,8 +3950,8 @@
         </p:nvSpPr>
         <p:spPr>
           <a:xfrm>
-            <a:off x="518160" y="137160"/>
-            <a:ext cx="11155680" cy="369332"/>
+            <a:off x="1035795" y="169216"/>
+            <a:ext cx="10012680" cy="369332"/>
           </a:xfrm>
           <a:prstGeom prst="rect">
             <a:avLst/>
@@ -3470,27 +3966,27 @@
           <a:p>
             <a:r>
               <a:rPr lang="fr-FR" dirty="0" smtClean="0"/>
-              <a:t>Le panier : permet la modification de la </a:t>
-            </a:r>
-            <a:r>
-              <a:rPr lang="fr-FR" dirty="0" err="1" smtClean="0"/>
-              <a:t>quantite</a:t>
+              <a:t>La </a:t>
             </a:r>
             <a:r>
               <a:rPr lang="fr-FR" dirty="0" smtClean="0"/>
-              <a:t> et peut </a:t>
-            </a:r>
-            <a:r>
-              <a:rPr lang="fr-FR" dirty="0" err="1" smtClean="0"/>
-              <a:t>etre</a:t>
+              <a:t>sélection </a:t>
             </a:r>
             <a:r>
               <a:rPr lang="fr-FR" dirty="0" smtClean="0"/>
-              <a:t> </a:t>
-            </a:r>
-            <a:r>
-              <a:rPr lang="fr-FR" dirty="0" err="1" smtClean="0"/>
-              <a:t>raffraichi</a:t>
+              <a:t>du titre d’un </a:t>
+            </a:r>
+            <a:r>
+              <a:rPr lang="fr-FR" dirty="0" smtClean="0"/>
+              <a:t>produit dans le menu </a:t>
+            </a:r>
+            <a:r>
+              <a:rPr lang="fr-FR" dirty="0" smtClean="0"/>
+              <a:t>affiche </a:t>
+            </a:r>
+            <a:r>
+              <a:rPr lang="fr-FR" dirty="0" smtClean="0"/>
+              <a:t>une autre page avec  photo et commentaire</a:t>
             </a:r>
             <a:endParaRPr lang="fr-FR" dirty="0"/>
           </a:p>
@@ -3506,13 +4002,13 @@
         </p:nvPicPr>
         <p:blipFill rotWithShape="1">
           <a:blip r:embed="rId2"/>
-          <a:srcRect l="929" t="8553" r="1976"/>
+          <a:srcRect l="6666" t="10351" r="8631"/>
           <a:stretch/>
         </p:blipFill>
         <p:spPr>
           <a:xfrm>
-            <a:off x="142965" y="506492"/>
-            <a:ext cx="11906069" cy="6304547"/>
+            <a:off x="649705" y="673769"/>
+            <a:ext cx="10398770" cy="6187771"/>
           </a:xfrm>
           <a:prstGeom prst="rect">
             <a:avLst/>
@@ -3522,13 +4018,20 @@
     </p:spTree>
     <p:extLst>
       <p:ext uri="{BB962C8B-B14F-4D97-AF65-F5344CB8AC3E}">
-        <p14:creationId xmlns:p14="http://schemas.microsoft.com/office/powerpoint/2010/main" val="2728538830"/>
+        <p14:creationId xmlns:p14="http://schemas.microsoft.com/office/powerpoint/2010/main" val="1141840705"/>
       </p:ext>
     </p:extLst>
   </p:cSld>
   <p:clrMapOvr>
     <a:masterClrMapping/>
   </p:clrMapOvr>
+  <p:timing>
+    <p:tnLst>
+      <p:par>
+        <p:cTn id="1" dur="indefinite" restart="never" nodeType="tmRoot"/>
+      </p:par>
+    </p:tnLst>
+  </p:timing>
 </p:sld>
 </file>
 
@@ -3557,8 +4060,8 @@
         </p:nvSpPr>
         <p:spPr>
           <a:xfrm>
-            <a:off x="1058779" y="0"/>
-            <a:ext cx="8867274" cy="369332"/>
+            <a:off x="518160" y="137160"/>
+            <a:ext cx="11155680" cy="369332"/>
           </a:xfrm>
           <a:prstGeom prst="rect">
             <a:avLst/>
@@ -3573,7 +4076,19 @@
           <a:p>
             <a:r>
               <a:rPr lang="fr-FR" dirty="0" smtClean="0"/>
-              <a:t>La validation du panier redirige directement sur la page de paiement</a:t>
+              <a:t>Le panier : permet la modification de la </a:t>
+            </a:r>
+            <a:r>
+              <a:rPr lang="fr-FR" dirty="0" smtClean="0"/>
+              <a:t>quantité </a:t>
+            </a:r>
+            <a:r>
+              <a:rPr lang="fr-FR" dirty="0" smtClean="0"/>
+              <a:t>et peut </a:t>
+            </a:r>
+            <a:r>
+              <a:rPr lang="fr-FR" dirty="0" smtClean="0"/>
+              <a:t>être rafraichi</a:t>
             </a:r>
             <a:endParaRPr lang="fr-FR" dirty="0"/>
           </a:p>
@@ -3581,7 +4096,7 @@
       </p:sp>
       <p:pic>
         <p:nvPicPr>
-          <p:cNvPr id="3" name="Image 2"/>
+          <p:cNvPr id="5" name="Image 4"/>
           <p:cNvPicPr>
             <a:picLocks noChangeAspect="1"/>
           </p:cNvPicPr>
@@ -3589,13 +4104,13 @@
         </p:nvPicPr>
         <p:blipFill rotWithShape="1">
           <a:blip r:embed="rId2"/>
-          <a:srcRect t="8373" r="2019"/>
+          <a:srcRect l="846" t="8513" r="2098" b="6357"/>
           <a:stretch/>
         </p:blipFill>
         <p:spPr>
           <a:xfrm>
-            <a:off x="733425" y="709862"/>
-            <a:ext cx="11093617" cy="5832603"/>
+            <a:off x="109307" y="732805"/>
+            <a:ext cx="11973385" cy="5904478"/>
           </a:xfrm>
           <a:prstGeom prst="rect">
             <a:avLst/>
@@ -3605,13 +4120,20 @@
     </p:spTree>
     <p:extLst>
       <p:ext uri="{BB962C8B-B14F-4D97-AF65-F5344CB8AC3E}">
-        <p14:creationId xmlns:p14="http://schemas.microsoft.com/office/powerpoint/2010/main" val="830140387"/>
+        <p14:creationId xmlns:p14="http://schemas.microsoft.com/office/powerpoint/2010/main" val="2728538830"/>
       </p:ext>
     </p:extLst>
   </p:cSld>
   <p:clrMapOvr>
     <a:masterClrMapping/>
   </p:clrMapOvr>
+  <p:timing>
+    <p:tnLst>
+      <p:par>
+        <p:cTn id="1" dur="indefinite" restart="never" nodeType="tmRoot"/>
+      </p:par>
+    </p:tnLst>
+  </p:timing>
 </p:sld>
 </file>
 
@@ -3640,8 +4162,8 @@
         </p:nvSpPr>
         <p:spPr>
           <a:xfrm>
-            <a:off x="457200" y="228600"/>
-            <a:ext cx="10317480" cy="369332"/>
+            <a:off x="1058779" y="0"/>
+            <a:ext cx="8867274" cy="369332"/>
           </a:xfrm>
           <a:prstGeom prst="rect">
             <a:avLst/>
@@ -3656,7 +4178,7 @@
           <a:p>
             <a:r>
               <a:rPr lang="fr-FR" dirty="0" smtClean="0"/>
-              <a:t>Une page offerte avec 2 fonctions : les client peuvent donner leurs avis </a:t>
+              <a:t>La validation du panier redirige directement sur la page de paiement</a:t>
             </a:r>
             <a:endParaRPr lang="fr-FR" dirty="0"/>
           </a:p>
@@ -3672,13 +4194,13 @@
         </p:nvPicPr>
         <p:blipFill rotWithShape="1">
           <a:blip r:embed="rId2"/>
-          <a:srcRect t="8283" r="2599"/>
+          <a:srcRect l="1818" t="8513" r="2258"/>
           <a:stretch/>
         </p:blipFill>
         <p:spPr>
           <a:xfrm>
-            <a:off x="757989" y="806115"/>
-            <a:ext cx="11044989" cy="5847347"/>
+            <a:off x="276725" y="601579"/>
+            <a:ext cx="11400007" cy="6112871"/>
           </a:xfrm>
           <a:prstGeom prst="rect">
             <a:avLst/>
@@ -3688,13 +4210,20 @@
     </p:spTree>
     <p:extLst>
       <p:ext uri="{BB962C8B-B14F-4D97-AF65-F5344CB8AC3E}">
-        <p14:creationId xmlns:p14="http://schemas.microsoft.com/office/powerpoint/2010/main" val="3825185614"/>
+        <p14:creationId xmlns:p14="http://schemas.microsoft.com/office/powerpoint/2010/main" val="830140387"/>
       </p:ext>
     </p:extLst>
   </p:cSld>
   <p:clrMapOvr>
     <a:masterClrMapping/>
   </p:clrMapOvr>
+  <p:timing>
+    <p:tnLst>
+      <p:par>
+        <p:cTn id="1" dur="indefinite" restart="never" nodeType="tmRoot"/>
+      </p:par>
+    </p:tnLst>
+  </p:timing>
 </p:sld>
 </file>
 
@@ -3738,7 +4267,15 @@
           <a:p>
             <a:r>
               <a:rPr lang="fr-FR" dirty="0" smtClean="0"/>
-              <a:t>Une page offerte avec 2 fonctions : localisation sur une carte</a:t>
+              <a:t>Une page offerte avec </a:t>
+            </a:r>
+            <a:r>
+              <a:rPr lang="fr-FR" dirty="0" smtClean="0"/>
+              <a:t>la fonction localisation </a:t>
+            </a:r>
+            <a:r>
+              <a:rPr lang="fr-FR" dirty="0" smtClean="0"/>
+              <a:t>sur une carte</a:t>
             </a:r>
             <a:endParaRPr lang="fr-FR" dirty="0"/>
           </a:p>
@@ -3777,6 +4314,13 @@
   <p:clrMapOvr>
     <a:masterClrMapping/>
   </p:clrMapOvr>
+  <p:timing>
+    <p:tnLst>
+      <p:par>
+        <p:cTn id="1" dur="indefinite" restart="never" nodeType="tmRoot"/>
+      </p:par>
+    </p:tnLst>
+  </p:timing>
 </p:sld>
 </file>
 

</xml_diff>

<commit_message>
Corrections minimes mise en pages et tournures de phrases ...
</commit_message>
<xml_diff>
--- a/ManuelUtilisateur.pptx
+++ b/ManuelUtilisateur.pptx
@@ -252,7 +252,7 @@
           <a:p>
             <a:fld id="{0035BCDF-0564-4679-99CF-E79D2F4CA840}" type="datetimeFigureOut">
               <a:rPr lang="fr-FR" smtClean="0"/>
-              <a:t>27/02/2015</a:t>
+              <a:t>28/02/2015</a:t>
             </a:fld>
             <a:endParaRPr lang="fr-FR"/>
           </a:p>
@@ -422,7 +422,7 @@
           <a:p>
             <a:fld id="{0035BCDF-0564-4679-99CF-E79D2F4CA840}" type="datetimeFigureOut">
               <a:rPr lang="fr-FR" smtClean="0"/>
-              <a:t>27/02/2015</a:t>
+              <a:t>28/02/2015</a:t>
             </a:fld>
             <a:endParaRPr lang="fr-FR"/>
           </a:p>
@@ -602,7 +602,7 @@
           <a:p>
             <a:fld id="{0035BCDF-0564-4679-99CF-E79D2F4CA840}" type="datetimeFigureOut">
               <a:rPr lang="fr-FR" smtClean="0"/>
-              <a:t>27/02/2015</a:t>
+              <a:t>28/02/2015</a:t>
             </a:fld>
             <a:endParaRPr lang="fr-FR"/>
           </a:p>
@@ -772,7 +772,7 @@
           <a:p>
             <a:fld id="{0035BCDF-0564-4679-99CF-E79D2F4CA840}" type="datetimeFigureOut">
               <a:rPr lang="fr-FR" smtClean="0"/>
-              <a:t>27/02/2015</a:t>
+              <a:t>28/02/2015</a:t>
             </a:fld>
             <a:endParaRPr lang="fr-FR"/>
           </a:p>
@@ -1018,7 +1018,7 @@
           <a:p>
             <a:fld id="{0035BCDF-0564-4679-99CF-E79D2F4CA840}" type="datetimeFigureOut">
               <a:rPr lang="fr-FR" smtClean="0"/>
-              <a:t>27/02/2015</a:t>
+              <a:t>28/02/2015</a:t>
             </a:fld>
             <a:endParaRPr lang="fr-FR"/>
           </a:p>
@@ -1250,7 +1250,7 @@
           <a:p>
             <a:fld id="{0035BCDF-0564-4679-99CF-E79D2F4CA840}" type="datetimeFigureOut">
               <a:rPr lang="fr-FR" smtClean="0"/>
-              <a:t>27/02/2015</a:t>
+              <a:t>28/02/2015</a:t>
             </a:fld>
             <a:endParaRPr lang="fr-FR"/>
           </a:p>
@@ -1617,7 +1617,7 @@
           <a:p>
             <a:fld id="{0035BCDF-0564-4679-99CF-E79D2F4CA840}" type="datetimeFigureOut">
               <a:rPr lang="fr-FR" smtClean="0"/>
-              <a:t>27/02/2015</a:t>
+              <a:t>28/02/2015</a:t>
             </a:fld>
             <a:endParaRPr lang="fr-FR"/>
           </a:p>
@@ -1735,7 +1735,7 @@
           <a:p>
             <a:fld id="{0035BCDF-0564-4679-99CF-E79D2F4CA840}" type="datetimeFigureOut">
               <a:rPr lang="fr-FR" smtClean="0"/>
-              <a:t>27/02/2015</a:t>
+              <a:t>28/02/2015</a:t>
             </a:fld>
             <a:endParaRPr lang="fr-FR"/>
           </a:p>
@@ -1830,7 +1830,7 @@
           <a:p>
             <a:fld id="{0035BCDF-0564-4679-99CF-E79D2F4CA840}" type="datetimeFigureOut">
               <a:rPr lang="fr-FR" smtClean="0"/>
-              <a:t>27/02/2015</a:t>
+              <a:t>28/02/2015</a:t>
             </a:fld>
             <a:endParaRPr lang="fr-FR"/>
           </a:p>
@@ -2107,7 +2107,7 @@
           <a:p>
             <a:fld id="{0035BCDF-0564-4679-99CF-E79D2F4CA840}" type="datetimeFigureOut">
               <a:rPr lang="fr-FR" smtClean="0"/>
-              <a:t>27/02/2015</a:t>
+              <a:t>28/02/2015</a:t>
             </a:fld>
             <a:endParaRPr lang="fr-FR"/>
           </a:p>
@@ -2360,7 +2360,7 @@
           <a:p>
             <a:fld id="{0035BCDF-0564-4679-99CF-E79D2F4CA840}" type="datetimeFigureOut">
               <a:rPr lang="fr-FR" smtClean="0"/>
-              <a:t>27/02/2015</a:t>
+              <a:t>28/02/2015</a:t>
             </a:fld>
             <a:endParaRPr lang="fr-FR"/>
           </a:p>
@@ -2573,7 +2573,7 @@
           <a:p>
             <a:fld id="{0035BCDF-0564-4679-99CF-E79D2F4CA840}" type="datetimeFigureOut">
               <a:rPr lang="fr-FR" smtClean="0"/>
-              <a:t>27/02/2015</a:t>
+              <a:t>28/02/2015</a:t>
             </a:fld>
             <a:endParaRPr lang="fr-FR"/>
           </a:p>
@@ -3024,8 +3024,8 @@
         </p:nvSpPr>
         <p:spPr>
           <a:xfrm>
-            <a:off x="7815491" y="155626"/>
-            <a:ext cx="3755900" cy="584775"/>
+            <a:off x="3336463" y="169572"/>
+            <a:ext cx="5519075" cy="584775"/>
           </a:xfrm>
           <a:prstGeom prst="rect">
             <a:avLst/>
@@ -3038,6 +3038,7 @@
           </a:bodyPr>
           <a:lstStyle/>
           <a:p>
+            <a:pPr algn="ctr"/>
             <a:r>
               <a:rPr lang="fr-FR" sz="3200" dirty="0" smtClean="0">
                 <a:effectLst>
@@ -3095,8 +3096,8 @@
         </p:nvSpPr>
         <p:spPr>
           <a:xfrm>
-            <a:off x="8707656" y="601773"/>
-            <a:ext cx="3484344" cy="369332"/>
+            <a:off x="8925828" y="461959"/>
+            <a:ext cx="2877152" cy="246221"/>
           </a:xfrm>
           <a:prstGeom prst="rect">
             <a:avLst/>
@@ -3110,10 +3111,34 @@
           <a:lstStyle/>
           <a:p>
             <a:r>
-              <a:rPr lang="fr-FR" dirty="0" smtClean="0"/>
-              <a:t>Guide d’installation page 10</a:t>
-            </a:r>
-            <a:endParaRPr lang="fr-FR" dirty="0"/>
+              <a:rPr lang="fr-FR" sz="1000" dirty="0" smtClean="0">
+                <a:solidFill>
+                  <a:schemeClr val="accent2"/>
+                </a:solidFill>
+              </a:rPr>
+              <a:t>(Guide </a:t>
+            </a:r>
+            <a:r>
+              <a:rPr lang="fr-FR" sz="1000" dirty="0" smtClean="0">
+                <a:solidFill>
+                  <a:schemeClr val="accent2"/>
+                </a:solidFill>
+              </a:rPr>
+              <a:t>d’installation </a:t>
+            </a:r>
+            <a:r>
+              <a:rPr lang="fr-FR" sz="1000" dirty="0" smtClean="0">
+                <a:solidFill>
+                  <a:schemeClr val="accent2"/>
+                </a:solidFill>
+              </a:rPr>
+              <a:t>page 10)</a:t>
+            </a:r>
+            <a:endParaRPr lang="fr-FR" sz="1000" dirty="0">
+              <a:solidFill>
+                <a:schemeClr val="accent2"/>
+              </a:solidFill>
+            </a:endParaRPr>
           </a:p>
         </p:txBody>
       </p:sp>
@@ -3162,8 +3187,8 @@
         </p:nvSpPr>
         <p:spPr>
           <a:xfrm>
-            <a:off x="401856" y="259080"/>
-            <a:ext cx="3484344" cy="369332"/>
+            <a:off x="3241064" y="264928"/>
+            <a:ext cx="5608808" cy="369332"/>
           </a:xfrm>
           <a:prstGeom prst="rect">
             <a:avLst/>
@@ -3176,13 +3201,14 @@
           </a:bodyPr>
           <a:lstStyle/>
           <a:p>
+            <a:pPr algn="ctr"/>
             <a:r>
               <a:rPr lang="fr-FR" b="1" u="sng" dirty="0" smtClean="0"/>
-              <a:t>Guide d’installation </a:t>
-            </a:r>
-            <a:r>
-              <a:rPr lang="fr-FR" dirty="0" smtClean="0"/>
-              <a:t>:</a:t>
+              <a:t>Guide </a:t>
+            </a:r>
+            <a:r>
+              <a:rPr lang="fr-FR" b="1" u="sng" dirty="0" smtClean="0"/>
+              <a:t>d’installation de la base de données et des sources</a:t>
             </a:r>
             <a:endParaRPr lang="fr-FR" dirty="0"/>
           </a:p>
@@ -3197,7 +3223,7 @@
         <p:spPr>
           <a:xfrm>
             <a:off x="401856" y="787438"/>
-            <a:ext cx="11287224" cy="5632311"/>
+            <a:ext cx="11287224" cy="5909310"/>
           </a:xfrm>
           <a:prstGeom prst="rect">
             <a:avLst/>
@@ -3233,87 +3259,131 @@
           <a:p>
             <a:r>
               <a:rPr lang="fr-FR" dirty="0" smtClean="0"/>
-              <a:t>Ouvrir </a:t>
-            </a:r>
-            <a:r>
-              <a:rPr lang="fr-FR" b="1" dirty="0" err="1"/>
+              <a:t>- Ouvrir </a:t>
+            </a:r>
+            <a:r>
+              <a:rPr lang="fr-FR" b="1" dirty="0"/>
               <a:t>X</a:t>
             </a:r>
             <a:r>
-              <a:rPr lang="fr-FR" b="1" dirty="0" err="1" smtClean="0"/>
-              <a:t>ampp</a:t>
-            </a:r>
+              <a:rPr lang="fr-FR" b="1" dirty="0" smtClean="0"/>
+              <a:t>ampp </a:t>
+            </a:r>
+            <a:r>
+              <a:rPr lang="fr-FR" dirty="0" smtClean="0"/>
+              <a:t>control panel</a:t>
+            </a:r>
+          </a:p>
+          <a:p>
+            <a:r>
+              <a:rPr lang="fr-FR" dirty="0" smtClean="0"/>
+              <a:t>- Cliquer </a:t>
+            </a:r>
+            <a:r>
+              <a:rPr lang="fr-FR" dirty="0" smtClean="0"/>
+              <a:t>sur </a:t>
+            </a:r>
+            <a:r>
+              <a:rPr lang="fr-FR" b="1" dirty="0" smtClean="0"/>
+              <a:t>Apache</a:t>
+            </a:r>
+          </a:p>
+          <a:p>
+            <a:r>
+              <a:rPr lang="fr-FR" dirty="0" smtClean="0"/>
+              <a:t>- Cliquer </a:t>
+            </a:r>
+            <a:r>
+              <a:rPr lang="fr-FR" dirty="0" smtClean="0"/>
+              <a:t>sur </a:t>
+            </a:r>
+            <a:r>
+              <a:rPr lang="fr-FR" b="1" dirty="0"/>
+              <a:t>M</a:t>
+            </a:r>
+            <a:r>
+              <a:rPr lang="fr-FR" b="1" dirty="0" smtClean="0"/>
+              <a:t>ysql</a:t>
+            </a:r>
+          </a:p>
+          <a:p>
+            <a:endParaRPr lang="fr-FR" dirty="0" smtClean="0"/>
+          </a:p>
+          <a:p>
+            <a:endParaRPr lang="fr-FR" dirty="0"/>
+          </a:p>
+          <a:p>
+            <a:endParaRPr lang="fr-FR" dirty="0" smtClean="0"/>
+          </a:p>
+          <a:p>
+            <a:endParaRPr lang="fr-FR" dirty="0"/>
+          </a:p>
+          <a:p>
+            <a:r>
+              <a:rPr lang="fr-FR" dirty="0" smtClean="0"/>
+              <a:t> - Cliquer </a:t>
+            </a:r>
+            <a:r>
+              <a:rPr lang="fr-FR" dirty="0" smtClean="0"/>
+              <a:t>sur Admin </a:t>
+            </a:r>
+          </a:p>
+          <a:p>
+            <a:r>
+              <a:rPr lang="fr-FR" dirty="0" smtClean="0"/>
+              <a:t> - Sur </a:t>
+            </a:r>
+            <a:r>
+              <a:rPr lang="fr-FR" dirty="0" smtClean="0"/>
+              <a:t>la page </a:t>
+            </a:r>
+            <a:r>
+              <a:rPr lang="fr-FR" b="1" dirty="0" smtClean="0"/>
+              <a:t>phpMyAdmin</a:t>
+            </a:r>
+          </a:p>
+          <a:p>
             <a:r>
               <a:rPr lang="fr-FR" b="1" dirty="0" smtClean="0"/>
               <a:t> </a:t>
             </a:r>
             <a:r>
               <a:rPr lang="fr-FR" dirty="0" smtClean="0"/>
-              <a:t>control panel</a:t>
-            </a:r>
-          </a:p>
-          <a:p>
+              <a:t>-</a:t>
+            </a:r>
+            <a:r>
+              <a:rPr lang="fr-FR" b="1" dirty="0" smtClean="0"/>
+              <a:t> Créer</a:t>
+            </a:r>
             <a:r>
               <a:rPr lang="fr-FR" dirty="0" smtClean="0"/>
-              <a:t>Clic sur </a:t>
-            </a:r>
-            <a:r>
-              <a:rPr lang="fr-FR" b="1" dirty="0" smtClean="0"/>
-              <a:t>Apache</a:t>
-            </a:r>
-          </a:p>
-          <a:p>
+              <a:t> </a:t>
+            </a:r>
             <a:r>
               <a:rPr lang="fr-FR" dirty="0" smtClean="0"/>
-              <a:t>Clic sur </a:t>
-            </a:r>
-            <a:r>
-              <a:rPr lang="fr-FR" b="1" dirty="0" err="1"/>
-              <a:t>M</a:t>
-            </a:r>
-            <a:r>
-              <a:rPr lang="fr-FR" b="1" dirty="0" err="1" smtClean="0"/>
-              <a:t>ysql</a:t>
-            </a:r>
-            <a:endParaRPr lang="fr-FR" b="1" dirty="0" smtClean="0"/>
-          </a:p>
-          <a:p>
-            <a:endParaRPr lang="fr-FR" dirty="0" smtClean="0"/>
-          </a:p>
-          <a:p>
-            <a:endParaRPr lang="fr-FR" dirty="0"/>
-          </a:p>
-          <a:p>
-            <a:endParaRPr lang="fr-FR" dirty="0" smtClean="0"/>
-          </a:p>
-          <a:p>
-            <a:endParaRPr lang="fr-FR" dirty="0"/>
-          </a:p>
-          <a:p>
+              <a:t>une nouvelle base </a:t>
+            </a:r>
             <a:r>
               <a:rPr lang="fr-FR" dirty="0" smtClean="0"/>
-              <a:t>Clic sur Admin </a:t>
-            </a:r>
-          </a:p>
-          <a:p>
+              <a:t>nommée </a:t>
+            </a:r>
+          </a:p>
+          <a:p>
+            <a:r>
+              <a:rPr lang="fr-FR" dirty="0"/>
+              <a:t> </a:t>
+            </a:r>
             <a:r>
               <a:rPr lang="fr-FR" dirty="0" smtClean="0"/>
-              <a:t>Sur la page </a:t>
-            </a:r>
-            <a:r>
-              <a:rPr lang="fr-FR" b="1" dirty="0" err="1" smtClean="0"/>
-              <a:t>phpMyAdmin</a:t>
-            </a:r>
-            <a:endParaRPr lang="fr-FR" b="1" dirty="0" smtClean="0"/>
-          </a:p>
-          <a:p>
-            <a:r>
-              <a:rPr lang="fr-FR" b="1" dirty="0" smtClean="0"/>
-              <a:t>Créer</a:t>
+              <a:t>    </a:t>
             </a:r>
             <a:r>
               <a:rPr lang="fr-FR" dirty="0" smtClean="0"/>
-              <a:t> une nouvelle base nommé « </a:t>
+              <a:t>«</a:t>
+            </a:r>
+            <a:r>
+              <a:rPr lang="fr-FR" dirty="0" smtClean="0"/>
+              <a:t> </a:t>
             </a:r>
             <a:r>
               <a:rPr lang="fr-FR" dirty="0" err="1" smtClean="0"/>
@@ -3328,9 +3398,17 @@
             <a:endParaRPr lang="fr-FR" dirty="0" smtClean="0"/>
           </a:p>
           <a:p>
+            <a:pPr marL="285750" indent="-285750">
+              <a:buFontTx/>
+              <a:buChar char="-"/>
+            </a:pPr>
             <a:r>
               <a:rPr lang="fr-FR" dirty="0" smtClean="0"/>
-              <a:t>Cliquer sur </a:t>
+              <a:t>Cliquer </a:t>
+            </a:r>
+            <a:r>
+              <a:rPr lang="fr-FR" dirty="0" smtClean="0"/>
+              <a:t>sur </a:t>
             </a:r>
             <a:r>
               <a:rPr lang="fr-FR" b="1" dirty="0" smtClean="0"/>
@@ -3340,11 +3418,20 @@
               <a:rPr lang="fr-FR" dirty="0" smtClean="0"/>
               <a:t> le fichier </a:t>
             </a:r>
-          </a:p>
-          <a:p>
+            <a:endParaRPr lang="fr-FR" dirty="0" smtClean="0"/>
+          </a:p>
+          <a:p>
+            <a:pPr marL="285750" indent="-285750">
+              <a:buFontTx/>
+              <a:buChar char="-"/>
+            </a:pPr>
             <a:r>
               <a:rPr lang="fr-FR" dirty="0" smtClean="0"/>
-              <a:t>Sélectionner le fichier </a:t>
+              <a:t>Sélectionner </a:t>
+            </a:r>
+            <a:r>
+              <a:rPr lang="fr-FR" dirty="0" smtClean="0"/>
+              <a:t>le fichier </a:t>
             </a:r>
             <a:r>
               <a:rPr lang="fr-FR" dirty="0" err="1" smtClean="0"/>
@@ -3364,30 +3451,56 @@
           <a:p>
             <a:r>
               <a:rPr lang="fr-FR" dirty="0" smtClean="0"/>
-              <a:t>Aller dans un navigateur et saisir l’adresse suivante</a:t>
-            </a:r>
-          </a:p>
-          <a:p>
+              <a:t>- Apres avoir décompressé des sources données, le dossier ProjetWeb le déplacer</a:t>
+            </a:r>
+            <a:r>
+              <a:rPr lang="fr-FR" dirty="0" smtClean="0"/>
+              <a:t> </a:t>
+            </a:r>
             <a:r>
               <a:rPr lang="fr-FR" dirty="0"/>
-              <a:t>http://</a:t>
-            </a:r>
+              <a:t>dans </a:t>
+            </a:r>
+            <a:r>
+              <a:rPr lang="fr-FR" b="1" dirty="0"/>
+              <a:t>C:\xampp\htdocs\ </a:t>
+            </a:r>
+            <a:endParaRPr lang="fr-FR" b="1" dirty="0" smtClean="0"/>
+          </a:p>
+          <a:p>
             <a:r>
               <a:rPr lang="fr-FR" dirty="0" smtClean="0"/>
-              <a:t>127.0.0.1/</a:t>
-            </a:r>
-            <a:r>
-              <a:rPr lang="fr-FR" dirty="0" smtClean="0">
+              <a:t>- Aller </a:t>
+            </a:r>
+            <a:r>
+              <a:rPr lang="fr-FR" dirty="0" smtClean="0"/>
+              <a:t>dans un navigateur et saisir l’adresse </a:t>
+            </a:r>
+            <a:r>
+              <a:rPr lang="fr-FR" dirty="0" smtClean="0"/>
+              <a:t>suivante  http://</a:t>
+            </a:r>
+            <a:r>
+              <a:rPr lang="fr-FR" dirty="0"/>
+              <a:t>127.0.0.1/ </a:t>
+            </a:r>
+            <a:r>
+              <a:rPr lang="fr-FR" dirty="0">
                 <a:solidFill>
                   <a:srgbClr val="FF0000"/>
                 </a:solidFill>
               </a:rPr>
-              <a:t>nomDuDossier</a:t>
+              <a:t>ProjetWeb </a:t>
+            </a:r>
+            <a:r>
+              <a:rPr lang="fr-FR" dirty="0"/>
+              <a:t>/</a:t>
             </a:r>
             <a:r>
               <a:rPr lang="fr-FR" dirty="0" smtClean="0"/>
-              <a:t>/index.php</a:t>
-            </a:r>
+              <a:t>index.php</a:t>
+            </a:r>
+            <a:endParaRPr lang="fr-FR" dirty="0" smtClean="0"/>
           </a:p>
         </p:txBody>
       </p:sp>
@@ -3599,6 +3712,45 @@
           </a:prstGeom>
         </p:spPr>
       </p:pic>
+      <p:sp>
+        <p:nvSpPr>
+          <p:cNvPr id="3" name="ZoneTexte 2"/>
+          <p:cNvSpPr txBox="1"/>
+          <p:nvPr/>
+        </p:nvSpPr>
+        <p:spPr>
+          <a:xfrm>
+            <a:off x="-106017" y="145774"/>
+            <a:ext cx="12191999" cy="369332"/>
+          </a:xfrm>
+          <a:prstGeom prst="rect">
+            <a:avLst/>
+          </a:prstGeom>
+          <a:noFill/>
+        </p:spPr>
+        <p:txBody>
+          <a:bodyPr wrap="square" rtlCol="0">
+            <a:spAutoFit/>
+          </a:bodyPr>
+          <a:lstStyle/>
+          <a:p>
+            <a:pPr algn="ctr"/>
+            <a:r>
+              <a:rPr lang="fr-FR" b="1" dirty="0" smtClean="0"/>
+              <a:t>La page « </a:t>
+            </a:r>
+            <a:r>
+              <a:rPr lang="fr-FR" b="1" dirty="0" err="1" smtClean="0"/>
+              <a:t>staff.php</a:t>
+            </a:r>
+            <a:r>
+              <a:rPr lang="fr-FR" b="1" dirty="0" smtClean="0"/>
+              <a:t> », permet l’ajout d’article et de coups de cœurs (elle est accessible avec des identifiants administrateurs) </a:t>
+            </a:r>
+            <a:endParaRPr lang="fr-FR" b="1" dirty="0"/>
+          </a:p>
+        </p:txBody>
+      </p:sp>
     </p:spTree>
     <p:extLst>
       <p:ext uri="{BB962C8B-B14F-4D97-AF65-F5344CB8AC3E}">
@@ -3658,19 +3810,12 @@
           </a:bodyPr>
           <a:lstStyle/>
           <a:p>
-            <a:r>
-              <a:rPr lang="fr-FR" dirty="0" smtClean="0"/>
-              <a:t>Sur la </a:t>
-            </a:r>
-            <a:r>
-              <a:rPr lang="fr-FR" dirty="0" smtClean="0"/>
-              <a:t>première </a:t>
-            </a:r>
-            <a:r>
-              <a:rPr lang="fr-FR" dirty="0" smtClean="0"/>
-              <a:t>page du site on peut voir apparaitre les coups de cœur du moment</a:t>
-            </a:r>
-            <a:endParaRPr lang="fr-FR" dirty="0"/>
+            <a:pPr algn="ctr"/>
+            <a:r>
+              <a:rPr lang="fr-FR" b="1" dirty="0" smtClean="0"/>
+              <a:t>Sur la première page du site on peut voir apparaitre les coups de cœur du moment</a:t>
+            </a:r>
+            <a:endParaRPr lang="fr-FR" b="1" dirty="0"/>
           </a:p>
         </p:txBody>
       </p:sp>
@@ -3742,8 +3887,8 @@
         </p:nvSpPr>
         <p:spPr>
           <a:xfrm>
-            <a:off x="1127760" y="365760"/>
-            <a:ext cx="10104120" cy="369332"/>
+            <a:off x="527611" y="244422"/>
+            <a:ext cx="11351150" cy="646331"/>
           </a:xfrm>
           <a:prstGeom prst="rect">
             <a:avLst/>
@@ -3756,27 +3901,62 @@
           </a:bodyPr>
           <a:lstStyle/>
           <a:p>
-            <a:r>
-              <a:rPr lang="fr-FR" dirty="0" smtClean="0"/>
-              <a:t>Offert : une fonction </a:t>
-            </a:r>
-            <a:r>
-              <a:rPr lang="fr-FR" dirty="0" smtClean="0"/>
-              <a:t>supplémentaire </a:t>
-            </a:r>
-            <a:r>
-              <a:rPr lang="fr-FR" dirty="0" smtClean="0"/>
-              <a:t>au </a:t>
-            </a:r>
-            <a:r>
-              <a:rPr lang="fr-FR" dirty="0" err="1" smtClean="0"/>
-              <a:t>spec</a:t>
-            </a:r>
-            <a:r>
-              <a:rPr lang="fr-FR" dirty="0" smtClean="0"/>
-              <a:t>   L’affichage des avis des clients</a:t>
-            </a:r>
-            <a:endParaRPr lang="fr-FR" dirty="0"/>
+            <a:pPr algn="ctr"/>
+            <a:r>
+              <a:rPr lang="fr-FR" b="1" u="sng" dirty="0" smtClean="0">
+                <a:latin typeface="Century Gothic" panose="020B0502020202020204" pitchFamily="34" charset="0"/>
+              </a:rPr>
+              <a:t>Bonus</a:t>
+            </a:r>
+            <a:r>
+              <a:rPr lang="fr-FR" b="1" dirty="0" smtClean="0">
+                <a:latin typeface="Century Gothic" panose="020B0502020202020204" pitchFamily="34" charset="0"/>
+              </a:rPr>
+              <a:t> : </a:t>
+            </a:r>
+            <a:r>
+              <a:rPr lang="fr-FR" b="1" dirty="0" smtClean="0">
+                <a:latin typeface="Century Gothic" panose="020B0502020202020204" pitchFamily="34" charset="0"/>
+              </a:rPr>
+              <a:t>une fonction supplémentaire </a:t>
+            </a:r>
+            <a:r>
+              <a:rPr lang="fr-FR" b="1" dirty="0" smtClean="0">
+                <a:latin typeface="Century Gothic" panose="020B0502020202020204" pitchFamily="34" charset="0"/>
+              </a:rPr>
+              <a:t>aux spécificités demandées </a:t>
+            </a:r>
+            <a:r>
+              <a:rPr lang="fr-FR" b="1" dirty="0" smtClean="0">
+                <a:latin typeface="Century Gothic" panose="020B0502020202020204" pitchFamily="34" charset="0"/>
+                <a:sym typeface="Wingdings" panose="05000000000000000000" pitchFamily="2" charset="2"/>
+              </a:rPr>
+              <a:t></a:t>
+            </a:r>
+            <a:r>
+              <a:rPr lang="fr-FR" b="1" dirty="0" smtClean="0">
+                <a:latin typeface="Century Gothic" panose="020B0502020202020204" pitchFamily="34" charset="0"/>
+              </a:rPr>
+              <a:t> La saisie après paiement </a:t>
+            </a:r>
+          </a:p>
+          <a:p>
+            <a:pPr algn="ctr"/>
+            <a:r>
+              <a:rPr lang="fr-FR" b="1" dirty="0" smtClean="0">
+                <a:latin typeface="Century Gothic" panose="020B0502020202020204" pitchFamily="34" charset="0"/>
+              </a:rPr>
+              <a:t>et l’affichage en bas de la page « index.php » des </a:t>
+            </a:r>
+            <a:r>
+              <a:rPr lang="fr-FR" b="1" dirty="0" smtClean="0">
+                <a:latin typeface="Century Gothic" panose="020B0502020202020204" pitchFamily="34" charset="0"/>
+              </a:rPr>
+              <a:t>avis des clients</a:t>
+            </a:r>
+            <a:endParaRPr lang="fr-FR" b="1" dirty="0">
+              <a:latin typeface="Century Gothic" panose="020B0502020202020204" pitchFamily="34" charset="0"/>
+            </a:endParaRPr>
           </a:p>
         </p:txBody>
       </p:sp>
@@ -3795,7 +3975,7 @@
         </p:blipFill>
         <p:spPr>
           <a:xfrm>
-            <a:off x="685800" y="890753"/>
+            <a:off x="527611" y="890753"/>
             <a:ext cx="11192961" cy="5967247"/>
           </a:xfrm>
           <a:prstGeom prst="rect">
@@ -3862,23 +4042,34 @@
           </a:bodyPr>
           <a:lstStyle/>
           <a:p>
-            <a:r>
-              <a:rPr lang="fr-FR" dirty="0" smtClean="0"/>
-              <a:t>La page des menu classiques avec une </a:t>
-            </a:r>
-            <a:r>
-              <a:rPr lang="fr-FR" dirty="0" smtClean="0"/>
-              <a:t>sélection </a:t>
-            </a:r>
-            <a:r>
-              <a:rPr lang="fr-FR" dirty="0" smtClean="0"/>
-              <a:t>par </a:t>
-            </a:r>
-            <a:r>
-              <a:rPr lang="fr-FR" dirty="0" smtClean="0"/>
-              <a:t>type d’article ou pour tous les articles</a:t>
-            </a:r>
-            <a:endParaRPr lang="fr-FR" dirty="0"/>
+            <a:pPr algn="ctr"/>
+            <a:r>
+              <a:rPr lang="fr-FR" b="1" dirty="0">
+                <a:latin typeface="Century Gothic" panose="020B0502020202020204" pitchFamily="34" charset="0"/>
+              </a:rPr>
+              <a:t>La page </a:t>
+            </a:r>
+            <a:r>
+              <a:rPr lang="fr-FR" b="1" dirty="0" smtClean="0">
+                <a:latin typeface="Century Gothic" panose="020B0502020202020204" pitchFamily="34" charset="0"/>
+              </a:rPr>
+              <a:t>« menu.php » inclue </a:t>
+            </a:r>
+            <a:r>
+              <a:rPr lang="fr-FR" b="1" dirty="0">
+                <a:latin typeface="Century Gothic" panose="020B0502020202020204" pitchFamily="34" charset="0"/>
+              </a:rPr>
+              <a:t>une sélection par type d’article ou pour tous </a:t>
+            </a:r>
+            <a:r>
+              <a:rPr lang="fr-FR" b="1" dirty="0" smtClean="0">
+                <a:latin typeface="Century Gothic" panose="020B0502020202020204" pitchFamily="34" charset="0"/>
+              </a:rPr>
+              <a:t>types confondus</a:t>
+            </a:r>
+            <a:endParaRPr lang="fr-FR" b="1" dirty="0">
+              <a:latin typeface="Century Gothic" panose="020B0502020202020204" pitchFamily="34" charset="0"/>
+            </a:endParaRPr>
           </a:p>
         </p:txBody>
       </p:sp>
@@ -3950,8 +4141,8 @@
         </p:nvSpPr>
         <p:spPr>
           <a:xfrm>
-            <a:off x="1035795" y="169216"/>
-            <a:ext cx="10012680" cy="369332"/>
+            <a:off x="649705" y="169216"/>
+            <a:ext cx="11303756" cy="369332"/>
           </a:xfrm>
           <a:prstGeom prst="rect">
             <a:avLst/>
@@ -3965,30 +4156,32 @@
           <a:lstStyle/>
           <a:p>
             <a:r>
-              <a:rPr lang="fr-FR" dirty="0" smtClean="0"/>
-              <a:t>La </a:t>
-            </a:r>
-            <a:r>
-              <a:rPr lang="fr-FR" dirty="0" smtClean="0"/>
-              <a:t>sélection </a:t>
-            </a:r>
-            <a:r>
-              <a:rPr lang="fr-FR" dirty="0" smtClean="0"/>
-              <a:t>du titre d’un </a:t>
-            </a:r>
-            <a:r>
-              <a:rPr lang="fr-FR" dirty="0" smtClean="0"/>
-              <a:t>produit dans le menu </a:t>
-            </a:r>
-            <a:r>
-              <a:rPr lang="fr-FR" dirty="0" smtClean="0"/>
-              <a:t>affiche </a:t>
-            </a:r>
-            <a:r>
-              <a:rPr lang="fr-FR" dirty="0" smtClean="0"/>
-              <a:t>une autre page avec  photo et commentaire</a:t>
-            </a:r>
-            <a:endParaRPr lang="fr-FR" dirty="0"/>
+              <a:rPr lang="fr-FR" b="1" dirty="0" smtClean="0">
+                <a:latin typeface="Century Gothic" panose="020B0502020202020204" pitchFamily="34" charset="0"/>
+              </a:rPr>
+              <a:t>Un clic sur le titre </a:t>
+            </a:r>
+            <a:r>
+              <a:rPr lang="fr-FR" b="1" dirty="0">
+                <a:latin typeface="Century Gothic" panose="020B0502020202020204" pitchFamily="34" charset="0"/>
+              </a:rPr>
+              <a:t>d’un produit dans le menu affiche une autre page </a:t>
+            </a:r>
+            <a:r>
+              <a:rPr lang="fr-FR" b="1" dirty="0" smtClean="0">
+                <a:latin typeface="Century Gothic" panose="020B0502020202020204" pitchFamily="34" charset="0"/>
+              </a:rPr>
+              <a:t>avec </a:t>
+            </a:r>
+            <a:r>
+              <a:rPr lang="fr-FR" b="1" dirty="0">
+                <a:latin typeface="Century Gothic" panose="020B0502020202020204" pitchFamily="34" charset="0"/>
+              </a:rPr>
+              <a:t>photo et commentaire</a:t>
+            </a:r>
+            <a:endParaRPr lang="fr-FR" b="1" dirty="0">
+              <a:latin typeface="Century Gothic" panose="020B0502020202020204" pitchFamily="34" charset="0"/>
+            </a:endParaRPr>
           </a:p>
         </p:txBody>
       </p:sp>
@@ -4074,23 +4267,28 @@
           </a:bodyPr>
           <a:lstStyle/>
           <a:p>
-            <a:r>
-              <a:rPr lang="fr-FR" dirty="0" smtClean="0"/>
-              <a:t>Le panier : permet la modification de la </a:t>
-            </a:r>
-            <a:r>
-              <a:rPr lang="fr-FR" dirty="0" smtClean="0"/>
-              <a:t>quantité </a:t>
-            </a:r>
-            <a:r>
-              <a:rPr lang="fr-FR" dirty="0" smtClean="0"/>
-              <a:t>et peut </a:t>
-            </a:r>
-            <a:r>
-              <a:rPr lang="fr-FR" dirty="0" smtClean="0"/>
-              <a:t>être rafraichi</a:t>
-            </a:r>
-            <a:endParaRPr lang="fr-FR" dirty="0"/>
+            <a:pPr algn="ctr"/>
+            <a:r>
+              <a:rPr lang="fr-FR" b="1" dirty="0">
+                <a:latin typeface="Century Gothic" panose="020B0502020202020204" pitchFamily="34" charset="0"/>
+              </a:rPr>
+              <a:t>Le panier </a:t>
+            </a:r>
+            <a:r>
+              <a:rPr lang="fr-FR" b="1" dirty="0" smtClean="0">
+                <a:latin typeface="Century Gothic" panose="020B0502020202020204" pitchFamily="34" charset="0"/>
+              </a:rPr>
+              <a:t>permet </a:t>
+            </a:r>
+            <a:r>
+              <a:rPr lang="fr-FR" b="1" dirty="0">
+                <a:latin typeface="Century Gothic" panose="020B0502020202020204" pitchFamily="34" charset="0"/>
+              </a:rPr>
+              <a:t>la modification de la quantité et peut être rafraichi</a:t>
+            </a:r>
+            <a:endParaRPr lang="fr-FR" b="1" dirty="0">
+              <a:latin typeface="Century Gothic" panose="020B0502020202020204" pitchFamily="34" charset="0"/>
+            </a:endParaRPr>
           </a:p>
         </p:txBody>
       </p:sp>
@@ -4162,7 +4360,7 @@
         </p:nvSpPr>
         <p:spPr>
           <a:xfrm>
-            <a:off x="1058779" y="0"/>
+            <a:off x="1543091" y="132522"/>
             <a:ext cx="8867274" cy="369332"/>
           </a:xfrm>
           <a:prstGeom prst="rect">
@@ -4176,11 +4374,16 @@
           </a:bodyPr>
           <a:lstStyle/>
           <a:p>
-            <a:r>
-              <a:rPr lang="fr-FR" dirty="0" smtClean="0"/>
+            <a:pPr algn="ctr"/>
+            <a:r>
+              <a:rPr lang="fr-FR" b="1" dirty="0">
+                <a:latin typeface="Century Gothic" panose="020B0502020202020204" pitchFamily="34" charset="0"/>
+              </a:rPr>
               <a:t>La validation du panier redirige directement sur la page de paiement</a:t>
             </a:r>
-            <a:endParaRPr lang="fr-FR" dirty="0"/>
+            <a:endParaRPr lang="fr-FR" b="1" dirty="0">
+              <a:latin typeface="Century Gothic" panose="020B0502020202020204" pitchFamily="34" charset="0"/>
+            </a:endParaRPr>
           </a:p>
         </p:txBody>
       </p:sp>
@@ -4265,19 +4468,40 @@
           </a:bodyPr>
           <a:lstStyle/>
           <a:p>
-            <a:r>
-              <a:rPr lang="fr-FR" dirty="0" smtClean="0"/>
-              <a:t>Une page offerte avec </a:t>
-            </a:r>
-            <a:r>
-              <a:rPr lang="fr-FR" dirty="0" smtClean="0"/>
-              <a:t>la fonction localisation </a:t>
-            </a:r>
-            <a:r>
-              <a:rPr lang="fr-FR" dirty="0" smtClean="0"/>
-              <a:t>sur une carte</a:t>
-            </a:r>
-            <a:endParaRPr lang="fr-FR" dirty="0"/>
+            <a:pPr algn="ctr"/>
+            <a:r>
+              <a:rPr lang="fr-FR" b="1" u="sng" dirty="0" smtClean="0">
+                <a:latin typeface="Century Gothic" panose="020B0502020202020204" pitchFamily="34" charset="0"/>
+              </a:rPr>
+              <a:t>BONUS</a:t>
+            </a:r>
+            <a:r>
+              <a:rPr lang="fr-FR" b="1" dirty="0" smtClean="0">
+                <a:latin typeface="Century Gothic" panose="020B0502020202020204" pitchFamily="34" charset="0"/>
+              </a:rPr>
+              <a:t> : Une </a:t>
+            </a:r>
+            <a:r>
+              <a:rPr lang="fr-FR" b="1" dirty="0">
+                <a:latin typeface="Century Gothic" panose="020B0502020202020204" pitchFamily="34" charset="0"/>
+              </a:rPr>
+              <a:t>page </a:t>
+            </a:r>
+            <a:r>
+              <a:rPr lang="fr-FR" b="1" dirty="0" smtClean="0">
+                <a:latin typeface="Century Gothic" panose="020B0502020202020204" pitchFamily="34" charset="0"/>
+              </a:rPr>
+              <a:t>contact contenant la </a:t>
+            </a:r>
+            <a:r>
+              <a:rPr lang="fr-FR" b="1" dirty="0">
+                <a:latin typeface="Century Gothic" panose="020B0502020202020204" pitchFamily="34" charset="0"/>
+              </a:rPr>
+              <a:t>fonction localisation sur une carte</a:t>
+            </a:r>
+            <a:endParaRPr lang="fr-FR" b="1" dirty="0">
+              <a:latin typeface="Century Gothic" panose="020B0502020202020204" pitchFamily="34" charset="0"/>
+            </a:endParaRPr>
           </a:p>
         </p:txBody>
       </p:sp>

</xml_diff>